<commit_message>
Updated slides last minute
</commit_message>
<xml_diff>
--- a/MobileCampLA2015.pptx
+++ b/MobileCampLA2015.pptx
@@ -12,16 +12,18 @@
     <p:sldId id="263" r:id="rId6"/>
     <p:sldId id="264" r:id="rId7"/>
     <p:sldId id="261" r:id="rId8"/>
-    <p:sldId id="267" r:id="rId9"/>
-    <p:sldId id="265" r:id="rId10"/>
-    <p:sldId id="268" r:id="rId11"/>
-    <p:sldId id="258" r:id="rId12"/>
-    <p:sldId id="259" r:id="rId13"/>
-    <p:sldId id="260" r:id="rId14"/>
-    <p:sldId id="266" r:id="rId15"/>
-    <p:sldId id="269" r:id="rId16"/>
-    <p:sldId id="272" r:id="rId17"/>
-    <p:sldId id="270" r:id="rId18"/>
+    <p:sldId id="273" r:id="rId9"/>
+    <p:sldId id="267" r:id="rId10"/>
+    <p:sldId id="265" r:id="rId11"/>
+    <p:sldId id="268" r:id="rId12"/>
+    <p:sldId id="274" r:id="rId13"/>
+    <p:sldId id="258" r:id="rId14"/>
+    <p:sldId id="259" r:id="rId15"/>
+    <p:sldId id="260" r:id="rId16"/>
+    <p:sldId id="266" r:id="rId17"/>
+    <p:sldId id="269" r:id="rId18"/>
+    <p:sldId id="272" r:id="rId19"/>
+    <p:sldId id="270" r:id="rId20"/>
   </p:sldIdLst>
   <p:sldSz cx="9144000" cy="6858000" type="screen4x3"/>
   <p:notesSz cx="6858000" cy="9144000"/>
@@ -406,7 +408,7 @@
           <a:p>
             <a:fld id="{B01F9CA3-105E-4857-9057-6DB6197DA786}" type="datetimeFigureOut">
               <a:rPr lang="en-US" smtClean="0"/>
-              <a:t>1/30/15</a:t>
+              <a:t>1/31/15</a:t>
             </a:fld>
             <a:endParaRPr lang="en-US"/>
           </a:p>
@@ -598,7 +600,7 @@
           <a:p>
             <a:fld id="{B01F9CA3-105E-4857-9057-6DB6197DA786}" type="datetimeFigureOut">
               <a:rPr lang="en-US" smtClean="0"/>
-              <a:t>1/30/15</a:t>
+              <a:t>1/31/15</a:t>
             </a:fld>
             <a:endParaRPr lang="en-US"/>
           </a:p>
@@ -867,7 +869,7 @@
           <a:p>
             <a:fld id="{B01F9CA3-105E-4857-9057-6DB6197DA786}" type="datetimeFigureOut">
               <a:rPr lang="en-US" smtClean="0"/>
-              <a:t>1/30/15</a:t>
+              <a:t>1/31/15</a:t>
             </a:fld>
             <a:endParaRPr lang="en-US"/>
           </a:p>
@@ -1046,7 +1048,7 @@
           <a:p>
             <a:fld id="{B01F9CA3-105E-4857-9057-6DB6197DA786}" type="datetimeFigureOut">
               <a:rPr lang="en-US" smtClean="0"/>
-              <a:t>1/30/15</a:t>
+              <a:t>1/31/15</a:t>
             </a:fld>
             <a:endParaRPr lang="en-US"/>
           </a:p>
@@ -1215,7 +1217,7 @@
           <a:p>
             <a:fld id="{B01F9CA3-105E-4857-9057-6DB6197DA786}" type="datetimeFigureOut">
               <a:rPr lang="en-US" smtClean="0"/>
-              <a:t>1/30/15</a:t>
+              <a:t>1/31/15</a:t>
             </a:fld>
             <a:endParaRPr lang="en-US"/>
           </a:p>
@@ -1457,7 +1459,7 @@
           <a:p>
             <a:fld id="{B01F9CA3-105E-4857-9057-6DB6197DA786}" type="datetimeFigureOut">
               <a:rPr lang="en-US" smtClean="0"/>
-              <a:t>1/30/15</a:t>
+              <a:t>1/31/15</a:t>
             </a:fld>
             <a:endParaRPr lang="en-US"/>
           </a:p>
@@ -1780,7 +1782,7 @@
           <a:p>
             <a:fld id="{B01F9CA3-105E-4857-9057-6DB6197DA786}" type="datetimeFigureOut">
               <a:rPr lang="en-US" smtClean="0"/>
-              <a:t>1/30/15</a:t>
+              <a:t>1/31/15</a:t>
             </a:fld>
             <a:endParaRPr lang="en-US"/>
           </a:p>
@@ -2078,7 +2080,7 @@
           <a:p>
             <a:fld id="{B01F9CA3-105E-4857-9057-6DB6197DA786}" type="datetimeFigureOut">
               <a:rPr lang="en-US" smtClean="0"/>
-              <a:t>1/30/15</a:t>
+              <a:t>1/31/15</a:t>
             </a:fld>
             <a:endParaRPr lang="en-US"/>
           </a:p>
@@ -2534,7 +2536,7 @@
           <a:p>
             <a:fld id="{B01F9CA3-105E-4857-9057-6DB6197DA786}" type="datetimeFigureOut">
               <a:rPr lang="en-US" smtClean="0"/>
-              <a:t>1/30/15</a:t>
+              <a:t>1/31/15</a:t>
             </a:fld>
             <a:endParaRPr lang="en-US"/>
           </a:p>
@@ -2647,7 +2649,7 @@
           <a:p>
             <a:fld id="{B01F9CA3-105E-4857-9057-6DB6197DA786}" type="datetimeFigureOut">
               <a:rPr lang="en-US" smtClean="0"/>
-              <a:t>1/30/15</a:t>
+              <a:t>1/31/15</a:t>
             </a:fld>
             <a:endParaRPr lang="en-US"/>
           </a:p>
@@ -2737,7 +2739,7 @@
           <a:p>
             <a:fld id="{B01F9CA3-105E-4857-9057-6DB6197DA786}" type="datetimeFigureOut">
               <a:rPr lang="en-US" smtClean="0"/>
-              <a:t>1/30/15</a:t>
+              <a:t>1/31/15</a:t>
             </a:fld>
             <a:endParaRPr lang="en-US"/>
           </a:p>
@@ -3019,7 +3021,7 @@
           <a:p>
             <a:fld id="{B01F9CA3-105E-4857-9057-6DB6197DA786}" type="datetimeFigureOut">
               <a:rPr lang="en-US" smtClean="0"/>
-              <a:t>1/30/15</a:t>
+              <a:t>1/31/15</a:t>
             </a:fld>
             <a:endParaRPr lang="en-US"/>
           </a:p>
@@ -3225,7 +3227,7 @@
           <a:p>
             <a:fld id="{B01F9CA3-105E-4857-9057-6DB6197DA786}" type="datetimeFigureOut">
               <a:rPr lang="en-US" smtClean="0"/>
-              <a:t>1/30/15</a:t>
+              <a:t>1/31/15</a:t>
             </a:fld>
             <a:endParaRPr lang="en-US"/>
           </a:p>
@@ -3786,12 +3788,8 @@
           <a:lstStyle/>
           <a:p>
             <a:r>
-              <a:rPr lang="en-US" dirty="0" err="1" smtClean="0"/>
-              <a:t>Salesforce</a:t>
-            </a:r>
-            <a:r>
-              <a:rPr lang="en-US" dirty="0" smtClean="0"/>
-              <a:t> Touch</a:t>
+              <a:rPr lang="en-US" dirty="0" smtClean="0"/>
+              <a:t>Touch? I Remember Touch…</a:t>
             </a:r>
             <a:endParaRPr lang="en-US" dirty="0"/>
           </a:p>
@@ -3799,7 +3797,7 @@
       </p:sp>
       <p:pic>
         <p:nvPicPr>
-          <p:cNvPr id="4" name="Content Placeholder 3" descr="salesforce_touch_screen.png"/>
+          <p:cNvPr id="4" name="Content Placeholder 3" descr="paulwilliams.jpg"/>
           <p:cNvPicPr>
             <a:picLocks noGrp="1" noChangeAspect="1"/>
           </p:cNvPicPr>
@@ -3815,17 +3813,47 @@
               </a:ext>
             </a:extLst>
           </a:blip>
-          <a:srcRect t="7769" b="7769"/>
+          <a:srcRect l="624" r="624"/>
           <a:stretch>
             <a:fillRect/>
           </a:stretch>
         </p:blipFill>
         <p:spPr/>
       </p:pic>
+      <p:pic>
+        <p:nvPicPr>
+          <p:cNvPr id="5" name="Picture 4" descr="salesforce touch.jpeg"/>
+          <p:cNvPicPr>
+            <a:picLocks noChangeAspect="1"/>
+          </p:cNvPicPr>
+          <p:nvPr/>
+        </p:nvPicPr>
+        <p:blipFill>
+          <a:blip r:embed="rId3">
+            <a:extLst>
+              <a:ext uri="{28A0092B-C50C-407E-A947-70E740481C1C}">
+                <a14:useLocalDpi xmlns:a14="http://schemas.microsoft.com/office/drawing/2010/main" val="0"/>
+              </a:ext>
+            </a:extLst>
+          </a:blip>
+          <a:stretch>
+            <a:fillRect/>
+          </a:stretch>
+        </p:blipFill>
+        <p:spPr>
+          <a:xfrm>
+            <a:off x="3562940" y="4560728"/>
+            <a:ext cx="1382873" cy="1382873"/>
+          </a:xfrm>
+          <a:prstGeom prst="rect">
+            <a:avLst/>
+          </a:prstGeom>
+        </p:spPr>
+      </p:pic>
     </p:spTree>
     <p:extLst>
       <p:ext uri="{BB962C8B-B14F-4D97-AF65-F5344CB8AC3E}">
-        <p14:creationId xmlns:p14="http://schemas.microsoft.com/office/powerpoint/2010/main" val="3639948688"/>
+        <p14:creationId xmlns:p14="http://schemas.microsoft.com/office/powerpoint/2010/main" val="1326830440"/>
       </p:ext>
     </p:extLst>
   </p:cSld>
@@ -3868,74 +3896,46 @@
           <a:lstStyle/>
           <a:p>
             <a:r>
-              <a:rPr lang="en-US" dirty="0" smtClean="0"/>
-              <a:t>What is Salesforce1?</a:t>
-            </a:r>
-            <a:endParaRPr lang="en-US" dirty="0"/>
-          </a:p>
-        </p:txBody>
-      </p:sp>
-      <p:sp>
-        <p:nvSpPr>
-          <p:cNvPr id="3" name="Content Placeholder 2"/>
-          <p:cNvSpPr>
-            <a:spLocks noGrp="1"/>
-          </p:cNvSpPr>
-          <p:nvPr>
-            <p:ph idx="1"/>
-          </p:nvPr>
-        </p:nvSpPr>
-        <p:spPr/>
-        <p:txBody>
-          <a:bodyPr/>
-          <a:lstStyle/>
-          <a:p>
-            <a:r>
-              <a:rPr lang="en-US" dirty="0" smtClean="0"/>
-              <a:t>NOT the Salesforce1 platform (which also includes a whole slew of other tech and marketing stuff)</a:t>
-            </a:r>
-          </a:p>
-          <a:p>
-            <a:r>
-              <a:rPr lang="en-US" dirty="0" smtClean="0"/>
-              <a:t>Mobile-friendly, responsive-design view that is driven by controller technologies that are designed for more than just a 13”+ monitor with a QWERTY</a:t>
-            </a:r>
-          </a:p>
-          <a:p>
-            <a:r>
-              <a:rPr lang="en-US" dirty="0" smtClean="0"/>
-              <a:t>Replaced </a:t>
-            </a:r>
-            <a:r>
               <a:rPr lang="en-US" dirty="0" err="1" smtClean="0"/>
               <a:t>Salesforce</a:t>
             </a:r>
             <a:r>
               <a:rPr lang="en-US" dirty="0" smtClean="0"/>
-              <a:t> Classic Mobile and </a:t>
-            </a:r>
-            <a:r>
-              <a:rPr lang="en-US" dirty="0" err="1" smtClean="0"/>
-              <a:t>Salesforce</a:t>
-            </a:r>
-            <a:r>
-              <a:rPr lang="en-US" dirty="0" smtClean="0"/>
               <a:t> Touch</a:t>
             </a:r>
-          </a:p>
-          <a:p>
-            <a:r>
-              <a:rPr lang="en-US" dirty="0" smtClean="0"/>
-              <a:t>Uses Aura for its visual magic</a:t>
-            </a:r>
             <a:endParaRPr lang="en-US" dirty="0"/>
           </a:p>
         </p:txBody>
       </p:sp>
+      <p:pic>
+        <p:nvPicPr>
+          <p:cNvPr id="4" name="Content Placeholder 3" descr="salesforce_touch_screen.png"/>
+          <p:cNvPicPr>
+            <a:picLocks noGrp="1" noChangeAspect="1"/>
+          </p:cNvPicPr>
+          <p:nvPr>
+            <p:ph idx="1"/>
+          </p:nvPr>
+        </p:nvPicPr>
+        <p:blipFill>
+          <a:blip r:embed="rId2">
+            <a:extLst>
+              <a:ext uri="{28A0092B-C50C-407E-A947-70E740481C1C}">
+                <a14:useLocalDpi xmlns:a14="http://schemas.microsoft.com/office/drawing/2010/main" val="0"/>
+              </a:ext>
+            </a:extLst>
+          </a:blip>
+          <a:srcRect t="7769" b="7769"/>
+          <a:stretch>
+            <a:fillRect/>
+          </a:stretch>
+        </p:blipFill>
+        <p:spPr/>
+      </p:pic>
     </p:spTree>
     <p:extLst>
       <p:ext uri="{BB962C8B-B14F-4D97-AF65-F5344CB8AC3E}">
-        <p14:creationId xmlns:p14="http://schemas.microsoft.com/office/powerpoint/2010/main" val="3161574694"/>
+        <p14:creationId xmlns:p14="http://schemas.microsoft.com/office/powerpoint/2010/main" val="3639948688"/>
       </p:ext>
     </p:extLst>
   </p:cSld>
@@ -3972,118 +3972,48 @@
             <p:ph type="title"/>
           </p:nvPr>
         </p:nvSpPr>
-        <p:spPr>
-          <a:xfrm>
-            <a:off x="549275" y="107576"/>
-            <a:ext cx="8042276" cy="1032974"/>
-          </a:xfrm>
-        </p:spPr>
-        <p:txBody>
-          <a:bodyPr/>
-          <a:lstStyle/>
-          <a:p>
-            <a:r>
-              <a:rPr lang="en-US" dirty="0" smtClean="0"/>
-              <a:t>What is </a:t>
-            </a:r>
-            <a:r>
-              <a:rPr lang="en-US" dirty="0" err="1" smtClean="0"/>
-              <a:t>Salesforce</a:t>
-            </a:r>
-            <a:r>
-              <a:rPr lang="en-US" dirty="0" smtClean="0"/>
-              <a:t> Aura?</a:t>
+        <p:spPr/>
+        <p:txBody>
+          <a:bodyPr/>
+          <a:lstStyle/>
+          <a:p>
+            <a:r>
+              <a:rPr lang="en-US" dirty="0" smtClean="0"/>
+              <a:t>How Mobile Is Today</a:t>
             </a:r>
             <a:endParaRPr lang="en-US" dirty="0"/>
           </a:p>
         </p:txBody>
       </p:sp>
-      <p:sp>
-        <p:nvSpPr>
-          <p:cNvPr id="3" name="Content Placeholder 2"/>
-          <p:cNvSpPr>
-            <a:spLocks noGrp="1"/>
-          </p:cNvSpPr>
+      <p:pic>
+        <p:nvPicPr>
+          <p:cNvPr id="4" name="Content Placeholder 3" descr="salesforce1_screen.jpeg"/>
+          <p:cNvPicPr>
+            <a:picLocks noGrp="1" noChangeAspect="1"/>
+          </p:cNvPicPr>
           <p:nvPr>
             <p:ph idx="1"/>
           </p:nvPr>
-        </p:nvSpPr>
-        <p:spPr>
-          <a:xfrm>
-            <a:off x="549275" y="1258133"/>
-            <a:ext cx="8042276" cy="4685468"/>
-          </a:xfrm>
-        </p:spPr>
-        <p:txBody>
-          <a:bodyPr>
-            <a:normAutofit lnSpcReduction="10000"/>
-          </a:bodyPr>
-          <a:lstStyle/>
-          <a:p>
-            <a:r>
-              <a:rPr lang="en-US" dirty="0" smtClean="0"/>
-              <a:t>BOOM. First organic search result.</a:t>
-            </a:r>
-          </a:p>
-          <a:p>
-            <a:pPr lvl="1"/>
-            <a:r>
-              <a:rPr lang="en-US" dirty="0">
-                <a:hlinkClick r:id="rId2"/>
-              </a:rPr>
-              <a:t>https://github.com/forcedotcom/</a:t>
-            </a:r>
-            <a:r>
-              <a:rPr lang="en-US" dirty="0" smtClean="0">
-                <a:hlinkClick r:id="rId2"/>
-              </a:rPr>
-              <a:t>aura</a:t>
-            </a:r>
-            <a:endParaRPr lang="en-US" dirty="0" smtClean="0"/>
-          </a:p>
-          <a:p>
-            <a:r>
-              <a:rPr lang="en-US" dirty="0"/>
-              <a:t>Aura is a UI framework for developing dynamic web apps for mobile and desktop devices, while providing a scalable long-lived lifecycle to support building apps engineered for growth. It supports partitioned multi-tier component development that bridges the client and server</a:t>
-            </a:r>
-            <a:r>
-              <a:rPr lang="en-US" dirty="0" smtClean="0"/>
-              <a:t>.</a:t>
-            </a:r>
-            <a:endParaRPr lang="en-US" dirty="0"/>
-          </a:p>
-          <a:p>
-            <a:r>
-              <a:rPr lang="en-US" dirty="0"/>
-              <a:t>To find out more about Aura, see the Aura Documentation site</a:t>
-            </a:r>
-            <a:r>
-              <a:rPr lang="en-US" dirty="0" smtClean="0"/>
-              <a:t>.</a:t>
-            </a:r>
-          </a:p>
-          <a:p>
-            <a:pPr lvl="1"/>
-            <a:r>
-              <a:rPr lang="en-US" dirty="0">
-                <a:hlinkClick r:id="rId3"/>
-              </a:rPr>
-              <a:t>http://documentation.auraframework.org/</a:t>
-            </a:r>
-            <a:r>
-              <a:rPr lang="en-US" dirty="0" smtClean="0">
-                <a:hlinkClick r:id="rId3"/>
-              </a:rPr>
-              <a:t>auradocs</a:t>
-            </a:r>
-            <a:endParaRPr lang="en-US" dirty="0" smtClean="0"/>
-          </a:p>
-        </p:txBody>
-      </p:sp>
+        </p:nvPicPr>
+        <p:blipFill>
+          <a:blip r:embed="rId2">
+            <a:extLst>
+              <a:ext uri="{28A0092B-C50C-407E-A947-70E740481C1C}">
+                <a14:useLocalDpi xmlns:a14="http://schemas.microsoft.com/office/drawing/2010/main" val="0"/>
+              </a:ext>
+            </a:extLst>
+          </a:blip>
+          <a:srcRect t="1167" b="1167"/>
+          <a:stretch>
+            <a:fillRect/>
+          </a:stretch>
+        </p:blipFill>
+        <p:spPr/>
+      </p:pic>
     </p:spTree>
     <p:extLst>
       <p:ext uri="{BB962C8B-B14F-4D97-AF65-F5344CB8AC3E}">
-        <p14:creationId xmlns:p14="http://schemas.microsoft.com/office/powerpoint/2010/main" val="2847025383"/>
+        <p14:creationId xmlns:p14="http://schemas.microsoft.com/office/powerpoint/2010/main" val="2028846138"/>
       </p:ext>
     </p:extLst>
   </p:cSld>
@@ -4127,7 +4057,7 @@
           <a:p>
             <a:r>
               <a:rPr lang="en-US" dirty="0" smtClean="0"/>
-              <a:t>What is Lightning?</a:t>
+              <a:t>What is Salesforce1?</a:t>
             </a:r>
             <a:endParaRPr lang="en-US" dirty="0"/>
           </a:p>
@@ -4150,7 +4080,19 @@
           <a:p>
             <a:r>
               <a:rPr lang="en-US" dirty="0" smtClean="0"/>
-              <a:t>A </a:t>
+              <a:t>NOT the Salesforce1 platform (which also includes a whole slew of other tech and marketing stuff)</a:t>
+            </a:r>
+          </a:p>
+          <a:p>
+            <a:r>
+              <a:rPr lang="en-US" dirty="0" smtClean="0"/>
+              <a:t>Mobile-friendly, responsive-design view that is driven by controller technologies that are designed for more than just a 13”+ monitor with a QWERTY</a:t>
+            </a:r>
+          </a:p>
+          <a:p>
+            <a:r>
+              <a:rPr lang="en-US" dirty="0" smtClean="0"/>
+              <a:t>Replaced </a:t>
             </a:r>
             <a:r>
               <a:rPr lang="en-US" dirty="0" err="1" smtClean="0"/>
@@ -4158,36 +4100,21 @@
             </a:r>
             <a:r>
               <a:rPr lang="en-US" dirty="0" smtClean="0"/>
-              <a:t> branding </a:t>
+              <a:t> Classic Mobile and </a:t>
             </a:r>
             <a:r>
               <a:rPr lang="en-US" dirty="0" err="1" smtClean="0"/>
-              <a:t>exo</a:t>
-            </a:r>
-            <a:r>
-              <a:rPr lang="en-US" dirty="0" smtClean="0"/>
-              <a:t>-skeleton that encompasses many things</a:t>
-            </a:r>
-          </a:p>
-          <a:p>
-            <a:pPr lvl="1"/>
-            <a:r>
-              <a:rPr lang="en-US" dirty="0" smtClean="0"/>
-              <a:t>New mobile friendly UI</a:t>
-            </a:r>
-          </a:p>
-          <a:p>
-            <a:pPr lvl="1"/>
-            <a:r>
-              <a:rPr lang="en-US" dirty="0" smtClean="0"/>
-              <a:t>External object connection</a:t>
-            </a:r>
-          </a:p>
-          <a:p>
-            <a:pPr lvl="1"/>
-            <a:r>
-              <a:rPr lang="en-US" dirty="0" smtClean="0"/>
-              <a:t>Lots of other stuff</a:t>
+              <a:t>Salesforce</a:t>
+            </a:r>
+            <a:r>
+              <a:rPr lang="en-US" dirty="0" smtClean="0"/>
+              <a:t> Touch</a:t>
+            </a:r>
+          </a:p>
+          <a:p>
+            <a:r>
+              <a:rPr lang="en-US" dirty="0" smtClean="0"/>
+              <a:t>Uses Aura for its visual magic</a:t>
             </a:r>
             <a:endParaRPr lang="en-US" dirty="0"/>
           </a:p>
@@ -4196,7 +4123,7 @@
     </p:spTree>
     <p:extLst>
       <p:ext uri="{BB962C8B-B14F-4D97-AF65-F5344CB8AC3E}">
-        <p14:creationId xmlns:p14="http://schemas.microsoft.com/office/powerpoint/2010/main" val="628559002"/>
+        <p14:creationId xmlns:p14="http://schemas.microsoft.com/office/powerpoint/2010/main" val="3161574694"/>
       </p:ext>
     </p:extLst>
   </p:cSld>
@@ -4233,14 +4160,27 @@
             <p:ph type="title"/>
           </p:nvPr>
         </p:nvSpPr>
-        <p:spPr/>
-        <p:txBody>
-          <a:bodyPr/>
-          <a:lstStyle/>
-          <a:p>
-            <a:r>
-              <a:rPr lang="en-US" dirty="0" smtClean="0"/>
-              <a:t>Lightning Components</a:t>
+        <p:spPr>
+          <a:xfrm>
+            <a:off x="549275" y="107576"/>
+            <a:ext cx="8042276" cy="1032974"/>
+          </a:xfrm>
+        </p:spPr>
+        <p:txBody>
+          <a:bodyPr/>
+          <a:lstStyle/>
+          <a:p>
+            <a:r>
+              <a:rPr lang="en-US" dirty="0" smtClean="0"/>
+              <a:t>What is </a:t>
+            </a:r>
+            <a:r>
+              <a:rPr lang="en-US" dirty="0" err="1" smtClean="0"/>
+              <a:t>Salesforce</a:t>
+            </a:r>
+            <a:r>
+              <a:rPr lang="en-US" dirty="0" smtClean="0"/>
+              <a:t> Aura?</a:t>
             </a:r>
             <a:endParaRPr lang="en-US" dirty="0"/>
           </a:p>
@@ -4256,38 +4196,82 @@
             <p:ph idx="1"/>
           </p:nvPr>
         </p:nvSpPr>
-        <p:spPr/>
-        <p:txBody>
-          <a:bodyPr/>
-          <a:lstStyle/>
+        <p:spPr>
+          <a:xfrm>
+            <a:off x="549275" y="1258133"/>
+            <a:ext cx="8042276" cy="4685468"/>
+          </a:xfrm>
+        </p:spPr>
+        <p:txBody>
+          <a:bodyPr>
+            <a:normAutofit lnSpcReduction="10000"/>
+          </a:bodyPr>
+          <a:lstStyle/>
+          <a:p>
+            <a:r>
+              <a:rPr lang="en-US" dirty="0" smtClean="0"/>
+              <a:t>BOOM. First organic search result.</a:t>
+            </a:r>
+          </a:p>
+          <a:p>
+            <a:pPr lvl="1"/>
+            <a:r>
+              <a:rPr lang="en-US" dirty="0">
+                <a:hlinkClick r:id="rId2"/>
+              </a:rPr>
+              <a:t>https://github.com/forcedotcom/</a:t>
+            </a:r>
+            <a:r>
+              <a:rPr lang="en-US" dirty="0" smtClean="0">
+                <a:hlinkClick r:id="rId2"/>
+              </a:rPr>
+              <a:t>aura</a:t>
+            </a:r>
+            <a:endParaRPr lang="en-US" dirty="0" smtClean="0"/>
+          </a:p>
           <a:p>
             <a:r>
               <a:rPr lang="en-US" dirty="0"/>
-              <a:t>Leverage pre-built components from </a:t>
-            </a:r>
-            <a:r>
-              <a:rPr lang="en-US" dirty="0" err="1"/>
-              <a:t>Salesforce</a:t>
-            </a:r>
+              <a:t>Aura is a UI framework for developing dynamic web apps for mobile and desktop devices, while providing a scalable long-lived lifecycle to support building apps engineered for growth. It supports partitioned multi-tier component development that bridges the client and server</a:t>
+            </a:r>
+            <a:r>
+              <a:rPr lang="en-US" dirty="0" smtClean="0"/>
+              <a:t>.</a:t>
+            </a:r>
+            <a:endParaRPr lang="en-US" dirty="0"/>
+          </a:p>
+          <a:p>
             <a:r>
               <a:rPr lang="en-US" dirty="0"/>
-              <a:t> and AppExchange Partners, or have your developers write their own components for anyone to use and build apps. Build dynamic apps for mobile and desktop devices with drag-and-drop tools on an open, multi-tier framework. Event-driven architecture, </a:t>
-            </a:r>
-            <a:r>
-              <a:rPr lang="en-US" dirty="0" err="1"/>
-              <a:t>stateful</a:t>
-            </a:r>
-            <a:r>
-              <a:rPr lang="en-US" dirty="0"/>
-              <a:t> client and stateless server, and Model-View-Controller architecture provides a modern framework for building apps, fast.</a:t>
-            </a:r>
+              <a:t>To find out more about Aura, see the Aura Documentation site</a:t>
+            </a:r>
+            <a:r>
+              <a:rPr lang="en-US" dirty="0" smtClean="0"/>
+              <a:t>.</a:t>
+            </a:r>
+          </a:p>
+          <a:p>
+            <a:pPr lvl="1"/>
+            <a:r>
+              <a:rPr lang="en-US" dirty="0">
+                <a:hlinkClick r:id="rId3"/>
+              </a:rPr>
+              <a:t>http://documentation.auraframework.org/</a:t>
+            </a:r>
+            <a:r>
+              <a:rPr lang="en-US" dirty="0" smtClean="0">
+                <a:hlinkClick r:id="rId3"/>
+              </a:rPr>
+              <a:t>auradocs</a:t>
+            </a:r>
+            <a:endParaRPr lang="en-US" dirty="0" smtClean="0"/>
           </a:p>
         </p:txBody>
       </p:sp>
     </p:spTree>
     <p:extLst>
       <p:ext uri="{BB962C8B-B14F-4D97-AF65-F5344CB8AC3E}">
-        <p14:creationId xmlns:p14="http://schemas.microsoft.com/office/powerpoint/2010/main" val="3137526864"/>
+        <p14:creationId xmlns:p14="http://schemas.microsoft.com/office/powerpoint/2010/main" val="2847025383"/>
       </p:ext>
     </p:extLst>
   </p:cSld>
@@ -4331,338 +4315,67 @@
           <a:p>
             <a:r>
               <a:rPr lang="en-US" dirty="0" smtClean="0"/>
-              <a:t>Lightning Components??</a:t>
+              <a:t>What is Lightning?</a:t>
             </a:r>
             <a:endParaRPr lang="en-US" dirty="0"/>
           </a:p>
         </p:txBody>
       </p:sp>
-      <p:pic>
-        <p:nvPicPr>
-          <p:cNvPr id="4" name="Content Placeholder 3" descr="lightning bolts.jpeg"/>
-          <p:cNvPicPr>
-            <a:picLocks noGrp="1" noChangeAspect="1"/>
-          </p:cNvPicPr>
+      <p:sp>
+        <p:nvSpPr>
+          <p:cNvPr id="3" name="Content Placeholder 2"/>
+          <p:cNvSpPr>
+            <a:spLocks noGrp="1"/>
+          </p:cNvSpPr>
           <p:nvPr>
             <p:ph idx="1"/>
           </p:nvPr>
-        </p:nvPicPr>
-        <p:blipFill rotWithShape="1">
-          <a:blip r:embed="rId2">
-            <a:extLst>
-              <a:ext uri="{28A0092B-C50C-407E-A947-70E740481C1C}">
-                <a14:useLocalDpi xmlns:a14="http://schemas.microsoft.com/office/drawing/2010/main" val="0"/>
-              </a:ext>
-            </a:extLst>
-          </a:blip>
-          <a:srcRect l="27530" t="3688" b="3375"/>
-          <a:stretch/>
-        </p:blipFill>
-        <p:spPr>
-          <a:xfrm>
-            <a:off x="2422330" y="2583410"/>
-            <a:ext cx="4080331" cy="3482114"/>
-          </a:xfrm>
-        </p:spPr>
-      </p:pic>
-      <p:sp>
-        <p:nvSpPr>
-          <p:cNvPr id="5" name="TextBox 4"/>
-          <p:cNvSpPr txBox="1"/>
-          <p:nvPr/>
-        </p:nvSpPr>
-        <p:spPr>
-          <a:xfrm>
-            <a:off x="6502661" y="2815421"/>
-            <a:ext cx="1951974" cy="923330"/>
-          </a:xfrm>
-          <a:prstGeom prst="rect">
-            <a:avLst/>
-          </a:prstGeom>
-          <a:noFill/>
-        </p:spPr>
-        <p:txBody>
-          <a:bodyPr wrap="square" rtlCol="0">
-            <a:spAutoFit/>
-          </a:bodyPr>
-          <a:lstStyle/>
-          <a:p>
-            <a:r>
-              <a:rPr lang="en-US" dirty="0" smtClean="0"/>
-              <a:t>Component</a:t>
-            </a:r>
-          </a:p>
-          <a:p>
-            <a:r>
-              <a:rPr lang="en-US" dirty="0" smtClean="0"/>
-              <a:t>.</a:t>
+        </p:nvSpPr>
+        <p:spPr/>
+        <p:txBody>
+          <a:bodyPr/>
+          <a:lstStyle/>
+          <a:p>
+            <a:r>
+              <a:rPr lang="en-US" dirty="0" smtClean="0"/>
+              <a:t>A </a:t>
             </a:r>
             <a:r>
               <a:rPr lang="en-US" dirty="0" err="1" smtClean="0"/>
-              <a:t>cmp</a:t>
-            </a:r>
-            <a:r>
-              <a:rPr lang="en-US" dirty="0" smtClean="0"/>
-              <a:t> file</a:t>
-            </a:r>
-            <a:br>
-              <a:rPr lang="en-US" dirty="0" smtClean="0"/>
-            </a:br>
-            <a:r>
-              <a:rPr lang="en-US" dirty="0" smtClean="0"/>
-              <a:t>(Static Markup)</a:t>
-            </a:r>
-            <a:endParaRPr lang="en-US" dirty="0"/>
-          </a:p>
-        </p:txBody>
-      </p:sp>
-      <p:sp>
-        <p:nvSpPr>
-          <p:cNvPr id="6" name="TextBox 5"/>
-          <p:cNvSpPr txBox="1"/>
-          <p:nvPr/>
-        </p:nvSpPr>
-        <p:spPr>
-          <a:xfrm>
-            <a:off x="470356" y="3092420"/>
-            <a:ext cx="1951974" cy="646331"/>
-          </a:xfrm>
-          <a:prstGeom prst="rect">
-            <a:avLst/>
-          </a:prstGeom>
-          <a:noFill/>
-        </p:spPr>
-        <p:txBody>
-          <a:bodyPr wrap="square" rtlCol="0">
-            <a:spAutoFit/>
-          </a:bodyPr>
-          <a:lstStyle/>
-          <a:p>
-            <a:r>
-              <a:rPr lang="en-US" dirty="0"/>
-              <a:t>Controller</a:t>
-            </a:r>
-            <a:endParaRPr lang="en-US" dirty="0" smtClean="0"/>
-          </a:p>
-          <a:p>
-            <a:r>
-              <a:rPr lang="en-US" dirty="0" smtClean="0"/>
-              <a:t>.</a:t>
+              <a:t>Salesforce</a:t>
+            </a:r>
+            <a:r>
+              <a:rPr lang="en-US" dirty="0" smtClean="0"/>
+              <a:t> branding </a:t>
             </a:r>
             <a:r>
               <a:rPr lang="en-US" dirty="0" err="1" smtClean="0"/>
-              <a:t>js</a:t>
-            </a:r>
-            <a:r>
-              <a:rPr lang="en-US" dirty="0" smtClean="0"/>
-              <a:t> file</a:t>
-            </a:r>
-            <a:endParaRPr lang="en-US" dirty="0"/>
-          </a:p>
-        </p:txBody>
-      </p:sp>
-      <p:sp>
-        <p:nvSpPr>
-          <p:cNvPr id="7" name="TextBox 6"/>
-          <p:cNvSpPr txBox="1"/>
-          <p:nvPr/>
-        </p:nvSpPr>
-        <p:spPr>
-          <a:xfrm>
-            <a:off x="6639577" y="4138905"/>
-            <a:ext cx="1951974" cy="646331"/>
-          </a:xfrm>
-          <a:prstGeom prst="rect">
-            <a:avLst/>
-          </a:prstGeom>
-          <a:noFill/>
-        </p:spPr>
-        <p:txBody>
-          <a:bodyPr wrap="square" rtlCol="0">
-            <a:spAutoFit/>
-          </a:bodyPr>
-          <a:lstStyle/>
-          <a:p>
-            <a:r>
-              <a:rPr lang="en-US" dirty="0"/>
-              <a:t>Helper</a:t>
-            </a:r>
-            <a:endParaRPr lang="en-US" dirty="0" smtClean="0"/>
-          </a:p>
-          <a:p>
-            <a:r>
-              <a:rPr lang="en-US" dirty="0" smtClean="0"/>
-              <a:t>.</a:t>
-            </a:r>
-            <a:r>
-              <a:rPr lang="en-US" dirty="0" err="1" smtClean="0"/>
-              <a:t>js</a:t>
-            </a:r>
-            <a:r>
-              <a:rPr lang="en-US" dirty="0" smtClean="0"/>
-              <a:t> file</a:t>
-            </a:r>
-            <a:endParaRPr lang="en-US" dirty="0"/>
-          </a:p>
-        </p:txBody>
-      </p:sp>
-      <p:sp>
-        <p:nvSpPr>
-          <p:cNvPr id="8" name="TextBox 7"/>
-          <p:cNvSpPr txBox="1"/>
-          <p:nvPr/>
-        </p:nvSpPr>
-        <p:spPr>
-          <a:xfrm>
-            <a:off x="470356" y="4020865"/>
-            <a:ext cx="1951974" cy="646331"/>
-          </a:xfrm>
-          <a:prstGeom prst="rect">
-            <a:avLst/>
-          </a:prstGeom>
-          <a:noFill/>
-        </p:spPr>
-        <p:txBody>
-          <a:bodyPr wrap="square" rtlCol="0">
-            <a:spAutoFit/>
-          </a:bodyPr>
-          <a:lstStyle/>
-          <a:p>
-            <a:r>
-              <a:rPr lang="en-US" dirty="0" smtClean="0"/>
-              <a:t>Style</a:t>
-            </a:r>
-          </a:p>
-          <a:p>
-            <a:r>
-              <a:rPr lang="en-US" dirty="0" smtClean="0"/>
-              <a:t>.</a:t>
-            </a:r>
-            <a:r>
-              <a:rPr lang="en-US" dirty="0" err="1" smtClean="0"/>
-              <a:t>css</a:t>
-            </a:r>
-            <a:r>
-              <a:rPr lang="en-US" dirty="0" smtClean="0"/>
-              <a:t> file</a:t>
-            </a:r>
-            <a:endParaRPr lang="en-US" dirty="0"/>
-          </a:p>
-        </p:txBody>
-      </p:sp>
-      <p:sp>
-        <p:nvSpPr>
-          <p:cNvPr id="9" name="TextBox 8"/>
-          <p:cNvSpPr txBox="1"/>
-          <p:nvPr/>
-        </p:nvSpPr>
-        <p:spPr>
-          <a:xfrm>
-            <a:off x="6502661" y="4985041"/>
-            <a:ext cx="1951974" cy="646331"/>
-          </a:xfrm>
-          <a:prstGeom prst="rect">
-            <a:avLst/>
-          </a:prstGeom>
-          <a:noFill/>
-        </p:spPr>
-        <p:txBody>
-          <a:bodyPr wrap="square" rtlCol="0">
-            <a:spAutoFit/>
-          </a:bodyPr>
-          <a:lstStyle/>
-          <a:p>
-            <a:r>
-              <a:rPr lang="en-US" dirty="0" smtClean="0"/>
-              <a:t>Documentation</a:t>
-            </a:r>
-          </a:p>
-          <a:p>
-            <a:r>
-              <a:rPr lang="en-US" dirty="0" smtClean="0"/>
-              <a:t>.</a:t>
-            </a:r>
-            <a:r>
-              <a:rPr lang="en-US" dirty="0" err="1" smtClean="0"/>
-              <a:t>auradoc</a:t>
-            </a:r>
-            <a:r>
-              <a:rPr lang="en-US" dirty="0" smtClean="0"/>
-              <a:t> file</a:t>
-            </a:r>
-            <a:endParaRPr lang="en-US" dirty="0"/>
-          </a:p>
-        </p:txBody>
-      </p:sp>
-      <p:sp>
-        <p:nvSpPr>
-          <p:cNvPr id="10" name="TextBox 9"/>
-          <p:cNvSpPr txBox="1"/>
-          <p:nvPr/>
-        </p:nvSpPr>
-        <p:spPr>
-          <a:xfrm>
-            <a:off x="470356" y="4985041"/>
-            <a:ext cx="1951974" cy="646331"/>
-          </a:xfrm>
-          <a:prstGeom prst="rect">
-            <a:avLst/>
-          </a:prstGeom>
-          <a:noFill/>
-        </p:spPr>
-        <p:txBody>
-          <a:bodyPr wrap="square" rtlCol="0">
-            <a:spAutoFit/>
-          </a:bodyPr>
-          <a:lstStyle/>
-          <a:p>
-            <a:r>
-              <a:rPr lang="en-US" dirty="0" smtClean="0"/>
-              <a:t>Renderer</a:t>
-            </a:r>
-          </a:p>
-          <a:p>
-            <a:r>
-              <a:rPr lang="en-US" dirty="0" smtClean="0"/>
-              <a:t>.</a:t>
-            </a:r>
-            <a:r>
-              <a:rPr lang="en-US" dirty="0" err="1" smtClean="0"/>
-              <a:t>js</a:t>
-            </a:r>
-            <a:r>
-              <a:rPr lang="en-US" dirty="0" smtClean="0"/>
-              <a:t> file</a:t>
-            </a:r>
-            <a:endParaRPr lang="en-US" dirty="0"/>
-          </a:p>
-        </p:txBody>
-      </p:sp>
-      <p:sp>
-        <p:nvSpPr>
-          <p:cNvPr id="11" name="TextBox 10"/>
-          <p:cNvSpPr txBox="1"/>
-          <p:nvPr/>
-        </p:nvSpPr>
-        <p:spPr>
-          <a:xfrm>
-            <a:off x="3515905" y="2128243"/>
-            <a:ext cx="2363536" cy="369332"/>
-          </a:xfrm>
-          <a:prstGeom prst="rect">
-            <a:avLst/>
-          </a:prstGeom>
-          <a:noFill/>
-        </p:spPr>
-        <p:txBody>
-          <a:bodyPr wrap="square" rtlCol="0">
-            <a:spAutoFit/>
-          </a:bodyPr>
-          <a:lstStyle/>
-          <a:p>
-            <a:r>
-              <a:rPr lang="en-US" dirty="0" smtClean="0"/>
-              <a:t>It’s a bundle…</a:t>
+              <a:t>exo</a:t>
+            </a:r>
+            <a:r>
+              <a:rPr lang="en-US" dirty="0" smtClean="0"/>
+              <a:t>-skeleton that encompasses many things</a:t>
+            </a:r>
+          </a:p>
+          <a:p>
+            <a:pPr lvl="1"/>
+            <a:r>
+              <a:rPr lang="en-US" dirty="0" smtClean="0"/>
+              <a:t>New mobile friendly UI</a:t>
+            </a:r>
+          </a:p>
+          <a:p>
+            <a:pPr lvl="1"/>
+            <a:r>
+              <a:rPr lang="en-US" dirty="0" smtClean="0"/>
+              <a:t>External object connection</a:t>
+            </a:r>
+          </a:p>
+          <a:p>
+            <a:pPr lvl="1"/>
+            <a:r>
+              <a:rPr lang="en-US" dirty="0" smtClean="0"/>
+              <a:t>Lots of other stuff</a:t>
             </a:r>
             <a:endParaRPr lang="en-US" dirty="0"/>
           </a:p>
@@ -4671,7 +4384,7 @@
     </p:spTree>
     <p:extLst>
       <p:ext uri="{BB962C8B-B14F-4D97-AF65-F5344CB8AC3E}">
-        <p14:creationId xmlns:p14="http://schemas.microsoft.com/office/powerpoint/2010/main" val="2124641994"/>
+        <p14:creationId xmlns:p14="http://schemas.microsoft.com/office/powerpoint/2010/main" val="628559002"/>
       </p:ext>
     </p:extLst>
   </p:cSld>
@@ -4715,6 +4428,481 @@
           <a:p>
             <a:r>
               <a:rPr lang="en-US" dirty="0" smtClean="0"/>
+              <a:t>Lightning Components</a:t>
+            </a:r>
+            <a:endParaRPr lang="en-US" dirty="0"/>
+          </a:p>
+        </p:txBody>
+      </p:sp>
+      <p:sp>
+        <p:nvSpPr>
+          <p:cNvPr id="3" name="Content Placeholder 2"/>
+          <p:cNvSpPr>
+            <a:spLocks noGrp="1"/>
+          </p:cNvSpPr>
+          <p:nvPr>
+            <p:ph idx="1"/>
+          </p:nvPr>
+        </p:nvSpPr>
+        <p:spPr/>
+        <p:txBody>
+          <a:bodyPr/>
+          <a:lstStyle/>
+          <a:p>
+            <a:r>
+              <a:rPr lang="en-US" dirty="0"/>
+              <a:t>Leverage pre-built components from </a:t>
+            </a:r>
+            <a:r>
+              <a:rPr lang="en-US" dirty="0" err="1"/>
+              <a:t>Salesforce</a:t>
+            </a:r>
+            <a:r>
+              <a:rPr lang="en-US" dirty="0"/>
+              <a:t> and AppExchange Partners, or have your developers write their own components for anyone to use and build apps. Build dynamic apps for mobile and desktop devices with drag-and-drop tools on an open, multi-tier framework. Event-driven architecture, </a:t>
+            </a:r>
+            <a:r>
+              <a:rPr lang="en-US" dirty="0" err="1"/>
+              <a:t>stateful</a:t>
+            </a:r>
+            <a:r>
+              <a:rPr lang="en-US" dirty="0"/>
+              <a:t> client and stateless server, and Model-View-Controller architecture provides a modern framework for building apps, fast.</a:t>
+            </a:r>
+          </a:p>
+        </p:txBody>
+      </p:sp>
+    </p:spTree>
+    <p:extLst>
+      <p:ext uri="{BB962C8B-B14F-4D97-AF65-F5344CB8AC3E}">
+        <p14:creationId xmlns:p14="http://schemas.microsoft.com/office/powerpoint/2010/main" val="3137526864"/>
+      </p:ext>
+    </p:extLst>
+  </p:cSld>
+  <p:clrMapOvr>
+    <a:masterClrMapping/>
+  </p:clrMapOvr>
+</p:sld>
+</file>
+
+<file path=ppt/slides/slide17.xml><?xml version="1.0" encoding="utf-8"?>
+<p:sld xmlns:a="http://schemas.openxmlformats.org/drawingml/2006/main" xmlns:r="http://schemas.openxmlformats.org/officeDocument/2006/relationships" xmlns:p="http://schemas.openxmlformats.org/presentationml/2006/main">
+  <p:cSld>
+    <p:spTree>
+      <p:nvGrpSpPr>
+        <p:cNvPr id="1" name=""/>
+        <p:cNvGrpSpPr/>
+        <p:nvPr/>
+      </p:nvGrpSpPr>
+      <p:grpSpPr>
+        <a:xfrm>
+          <a:off x="0" y="0"/>
+          <a:ext cx="0" cy="0"/>
+          <a:chOff x="0" y="0"/>
+          <a:chExt cx="0" cy="0"/>
+        </a:xfrm>
+      </p:grpSpPr>
+      <p:sp>
+        <p:nvSpPr>
+          <p:cNvPr id="2" name="Title 1"/>
+          <p:cNvSpPr>
+            <a:spLocks noGrp="1"/>
+          </p:cNvSpPr>
+          <p:nvPr>
+            <p:ph type="title"/>
+          </p:nvPr>
+        </p:nvSpPr>
+        <p:spPr/>
+        <p:txBody>
+          <a:bodyPr/>
+          <a:lstStyle/>
+          <a:p>
+            <a:r>
+              <a:rPr lang="en-US" dirty="0" smtClean="0"/>
+              <a:t>Lightning Components??</a:t>
+            </a:r>
+            <a:endParaRPr lang="en-US" dirty="0"/>
+          </a:p>
+        </p:txBody>
+      </p:sp>
+      <p:pic>
+        <p:nvPicPr>
+          <p:cNvPr id="4" name="Content Placeholder 3" descr="lightning bolts.jpeg"/>
+          <p:cNvPicPr>
+            <a:picLocks noGrp="1" noChangeAspect="1"/>
+          </p:cNvPicPr>
+          <p:nvPr>
+            <p:ph idx="1"/>
+          </p:nvPr>
+        </p:nvPicPr>
+        <p:blipFill rotWithShape="1">
+          <a:blip r:embed="rId2">
+            <a:extLst>
+              <a:ext uri="{28A0092B-C50C-407E-A947-70E740481C1C}">
+                <a14:useLocalDpi xmlns:a14="http://schemas.microsoft.com/office/drawing/2010/main" val="0"/>
+              </a:ext>
+            </a:extLst>
+          </a:blip>
+          <a:srcRect l="27530" t="3688" b="3375"/>
+          <a:stretch/>
+        </p:blipFill>
+        <p:spPr>
+          <a:xfrm>
+            <a:off x="2422330" y="2583410"/>
+            <a:ext cx="4080331" cy="3482114"/>
+          </a:xfrm>
+        </p:spPr>
+      </p:pic>
+      <p:sp>
+        <p:nvSpPr>
+          <p:cNvPr id="5" name="TextBox 4"/>
+          <p:cNvSpPr txBox="1"/>
+          <p:nvPr/>
+        </p:nvSpPr>
+        <p:spPr>
+          <a:xfrm>
+            <a:off x="6502661" y="2815421"/>
+            <a:ext cx="1951974" cy="923330"/>
+          </a:xfrm>
+          <a:prstGeom prst="rect">
+            <a:avLst/>
+          </a:prstGeom>
+          <a:noFill/>
+        </p:spPr>
+        <p:txBody>
+          <a:bodyPr wrap="square" rtlCol="0">
+            <a:spAutoFit/>
+          </a:bodyPr>
+          <a:lstStyle/>
+          <a:p>
+            <a:r>
+              <a:rPr lang="en-US" dirty="0" smtClean="0"/>
+              <a:t>Component</a:t>
+            </a:r>
+          </a:p>
+          <a:p>
+            <a:r>
+              <a:rPr lang="en-US" dirty="0" smtClean="0"/>
+              <a:t>.</a:t>
+            </a:r>
+            <a:r>
+              <a:rPr lang="en-US" dirty="0" err="1" smtClean="0"/>
+              <a:t>cmp</a:t>
+            </a:r>
+            <a:r>
+              <a:rPr lang="en-US" dirty="0" smtClean="0"/>
+              <a:t> file</a:t>
+            </a:r>
+            <a:br>
+              <a:rPr lang="en-US" dirty="0" smtClean="0"/>
+            </a:br>
+            <a:r>
+              <a:rPr lang="en-US" dirty="0" smtClean="0"/>
+              <a:t>(Static Markup)</a:t>
+            </a:r>
+            <a:endParaRPr lang="en-US" dirty="0"/>
+          </a:p>
+        </p:txBody>
+      </p:sp>
+      <p:sp>
+        <p:nvSpPr>
+          <p:cNvPr id="6" name="TextBox 5"/>
+          <p:cNvSpPr txBox="1"/>
+          <p:nvPr/>
+        </p:nvSpPr>
+        <p:spPr>
+          <a:xfrm>
+            <a:off x="470356" y="3092420"/>
+            <a:ext cx="1951974" cy="646331"/>
+          </a:xfrm>
+          <a:prstGeom prst="rect">
+            <a:avLst/>
+          </a:prstGeom>
+          <a:noFill/>
+        </p:spPr>
+        <p:txBody>
+          <a:bodyPr wrap="square" rtlCol="0">
+            <a:spAutoFit/>
+          </a:bodyPr>
+          <a:lstStyle/>
+          <a:p>
+            <a:r>
+              <a:rPr lang="en-US" dirty="0"/>
+              <a:t>Controller</a:t>
+            </a:r>
+            <a:endParaRPr lang="en-US" dirty="0" smtClean="0"/>
+          </a:p>
+          <a:p>
+            <a:r>
+              <a:rPr lang="en-US" dirty="0" smtClean="0"/>
+              <a:t>.</a:t>
+            </a:r>
+            <a:r>
+              <a:rPr lang="en-US" dirty="0" err="1" smtClean="0"/>
+              <a:t>js</a:t>
+            </a:r>
+            <a:r>
+              <a:rPr lang="en-US" dirty="0" smtClean="0"/>
+              <a:t> file</a:t>
+            </a:r>
+            <a:endParaRPr lang="en-US" dirty="0"/>
+          </a:p>
+        </p:txBody>
+      </p:sp>
+      <p:sp>
+        <p:nvSpPr>
+          <p:cNvPr id="7" name="TextBox 6"/>
+          <p:cNvSpPr txBox="1"/>
+          <p:nvPr/>
+        </p:nvSpPr>
+        <p:spPr>
+          <a:xfrm>
+            <a:off x="6639577" y="4138905"/>
+            <a:ext cx="1951974" cy="646331"/>
+          </a:xfrm>
+          <a:prstGeom prst="rect">
+            <a:avLst/>
+          </a:prstGeom>
+          <a:noFill/>
+        </p:spPr>
+        <p:txBody>
+          <a:bodyPr wrap="square" rtlCol="0">
+            <a:spAutoFit/>
+          </a:bodyPr>
+          <a:lstStyle/>
+          <a:p>
+            <a:r>
+              <a:rPr lang="en-US" dirty="0"/>
+              <a:t>Helper</a:t>
+            </a:r>
+            <a:endParaRPr lang="en-US" dirty="0" smtClean="0"/>
+          </a:p>
+          <a:p>
+            <a:r>
+              <a:rPr lang="en-US" dirty="0" smtClean="0"/>
+              <a:t>.</a:t>
+            </a:r>
+            <a:r>
+              <a:rPr lang="en-US" dirty="0" err="1" smtClean="0"/>
+              <a:t>js</a:t>
+            </a:r>
+            <a:r>
+              <a:rPr lang="en-US" dirty="0" smtClean="0"/>
+              <a:t> file</a:t>
+            </a:r>
+            <a:endParaRPr lang="en-US" dirty="0"/>
+          </a:p>
+        </p:txBody>
+      </p:sp>
+      <p:sp>
+        <p:nvSpPr>
+          <p:cNvPr id="8" name="TextBox 7"/>
+          <p:cNvSpPr txBox="1"/>
+          <p:nvPr/>
+        </p:nvSpPr>
+        <p:spPr>
+          <a:xfrm>
+            <a:off x="470356" y="4020865"/>
+            <a:ext cx="1951974" cy="646331"/>
+          </a:xfrm>
+          <a:prstGeom prst="rect">
+            <a:avLst/>
+          </a:prstGeom>
+          <a:noFill/>
+        </p:spPr>
+        <p:txBody>
+          <a:bodyPr wrap="square" rtlCol="0">
+            <a:spAutoFit/>
+          </a:bodyPr>
+          <a:lstStyle/>
+          <a:p>
+            <a:r>
+              <a:rPr lang="en-US" dirty="0" smtClean="0"/>
+              <a:t>Style</a:t>
+            </a:r>
+          </a:p>
+          <a:p>
+            <a:r>
+              <a:rPr lang="en-US" dirty="0" smtClean="0"/>
+              <a:t>.</a:t>
+            </a:r>
+            <a:r>
+              <a:rPr lang="en-US" dirty="0" err="1" smtClean="0"/>
+              <a:t>css</a:t>
+            </a:r>
+            <a:r>
+              <a:rPr lang="en-US" dirty="0" smtClean="0"/>
+              <a:t> file</a:t>
+            </a:r>
+            <a:endParaRPr lang="en-US" dirty="0"/>
+          </a:p>
+        </p:txBody>
+      </p:sp>
+      <p:sp>
+        <p:nvSpPr>
+          <p:cNvPr id="9" name="TextBox 8"/>
+          <p:cNvSpPr txBox="1"/>
+          <p:nvPr/>
+        </p:nvSpPr>
+        <p:spPr>
+          <a:xfrm>
+            <a:off x="6502661" y="4985041"/>
+            <a:ext cx="1951974" cy="646331"/>
+          </a:xfrm>
+          <a:prstGeom prst="rect">
+            <a:avLst/>
+          </a:prstGeom>
+          <a:noFill/>
+        </p:spPr>
+        <p:txBody>
+          <a:bodyPr wrap="square" rtlCol="0">
+            <a:spAutoFit/>
+          </a:bodyPr>
+          <a:lstStyle/>
+          <a:p>
+            <a:r>
+              <a:rPr lang="en-US" dirty="0" smtClean="0"/>
+              <a:t>Documentation</a:t>
+            </a:r>
+          </a:p>
+          <a:p>
+            <a:r>
+              <a:rPr lang="en-US" dirty="0" smtClean="0"/>
+              <a:t>.</a:t>
+            </a:r>
+            <a:r>
+              <a:rPr lang="en-US" dirty="0" err="1" smtClean="0"/>
+              <a:t>auradoc</a:t>
+            </a:r>
+            <a:r>
+              <a:rPr lang="en-US" dirty="0" smtClean="0"/>
+              <a:t> file</a:t>
+            </a:r>
+            <a:endParaRPr lang="en-US" dirty="0"/>
+          </a:p>
+        </p:txBody>
+      </p:sp>
+      <p:sp>
+        <p:nvSpPr>
+          <p:cNvPr id="10" name="TextBox 9"/>
+          <p:cNvSpPr txBox="1"/>
+          <p:nvPr/>
+        </p:nvSpPr>
+        <p:spPr>
+          <a:xfrm>
+            <a:off x="470356" y="4985041"/>
+            <a:ext cx="1951974" cy="646331"/>
+          </a:xfrm>
+          <a:prstGeom prst="rect">
+            <a:avLst/>
+          </a:prstGeom>
+          <a:noFill/>
+        </p:spPr>
+        <p:txBody>
+          <a:bodyPr wrap="square" rtlCol="0">
+            <a:spAutoFit/>
+          </a:bodyPr>
+          <a:lstStyle/>
+          <a:p>
+            <a:r>
+              <a:rPr lang="en-US" dirty="0" smtClean="0"/>
+              <a:t>Renderer</a:t>
+            </a:r>
+          </a:p>
+          <a:p>
+            <a:r>
+              <a:rPr lang="en-US" dirty="0" smtClean="0"/>
+              <a:t>.</a:t>
+            </a:r>
+            <a:r>
+              <a:rPr lang="en-US" dirty="0" err="1" smtClean="0"/>
+              <a:t>js</a:t>
+            </a:r>
+            <a:r>
+              <a:rPr lang="en-US" dirty="0" smtClean="0"/>
+              <a:t> file</a:t>
+            </a:r>
+            <a:endParaRPr lang="en-US" dirty="0"/>
+          </a:p>
+        </p:txBody>
+      </p:sp>
+      <p:sp>
+        <p:nvSpPr>
+          <p:cNvPr id="11" name="TextBox 10"/>
+          <p:cNvSpPr txBox="1"/>
+          <p:nvPr/>
+        </p:nvSpPr>
+        <p:spPr>
+          <a:xfrm>
+            <a:off x="3515905" y="2128243"/>
+            <a:ext cx="2363536" cy="369332"/>
+          </a:xfrm>
+          <a:prstGeom prst="rect">
+            <a:avLst/>
+          </a:prstGeom>
+          <a:noFill/>
+        </p:spPr>
+        <p:txBody>
+          <a:bodyPr wrap="square" rtlCol="0">
+            <a:spAutoFit/>
+          </a:bodyPr>
+          <a:lstStyle/>
+          <a:p>
+            <a:r>
+              <a:rPr lang="en-US" dirty="0" smtClean="0"/>
+              <a:t>It’s a bundle…</a:t>
+            </a:r>
+            <a:endParaRPr lang="en-US" dirty="0"/>
+          </a:p>
+        </p:txBody>
+      </p:sp>
+    </p:spTree>
+    <p:extLst>
+      <p:ext uri="{BB962C8B-B14F-4D97-AF65-F5344CB8AC3E}">
+        <p14:creationId xmlns:p14="http://schemas.microsoft.com/office/powerpoint/2010/main" val="2124641994"/>
+      </p:ext>
+    </p:extLst>
+  </p:cSld>
+  <p:clrMapOvr>
+    <a:masterClrMapping/>
+  </p:clrMapOvr>
+</p:sld>
+</file>
+
+<file path=ppt/slides/slide18.xml><?xml version="1.0" encoding="utf-8"?>
+<p:sld xmlns:a="http://schemas.openxmlformats.org/drawingml/2006/main" xmlns:r="http://schemas.openxmlformats.org/officeDocument/2006/relationships" xmlns:p="http://schemas.openxmlformats.org/presentationml/2006/main">
+  <p:cSld>
+    <p:spTree>
+      <p:nvGrpSpPr>
+        <p:cNvPr id="1" name=""/>
+        <p:cNvGrpSpPr/>
+        <p:nvPr/>
+      </p:nvGrpSpPr>
+      <p:grpSpPr>
+        <a:xfrm>
+          <a:off x="0" y="0"/>
+          <a:ext cx="0" cy="0"/>
+          <a:chOff x="0" y="0"/>
+          <a:chExt cx="0" cy="0"/>
+        </a:xfrm>
+      </p:grpSpPr>
+      <p:sp>
+        <p:nvSpPr>
+          <p:cNvPr id="2" name="Title 1"/>
+          <p:cNvSpPr>
+            <a:spLocks noGrp="1"/>
+          </p:cNvSpPr>
+          <p:nvPr>
+            <p:ph type="title"/>
+          </p:nvPr>
+        </p:nvSpPr>
+        <p:spPr/>
+        <p:txBody>
+          <a:bodyPr/>
+          <a:lstStyle/>
+          <a:p>
+            <a:r>
+              <a:rPr lang="en-US" dirty="0" smtClean="0"/>
               <a:t>Show Me The Code!</a:t>
             </a:r>
             <a:endParaRPr lang="en-US" dirty="0"/>
@@ -4774,7 +4962,7 @@
 </p:sld>
 </file>
 
-<file path=ppt/slides/slide17.xml><?xml version="1.0" encoding="utf-8"?>
+<file path=ppt/slides/slide19.xml><?xml version="1.0" encoding="utf-8"?>
 <p:sld xmlns:a="http://schemas.openxmlformats.org/drawingml/2006/main" xmlns:r="http://schemas.openxmlformats.org/officeDocument/2006/relationships" xmlns:p="http://schemas.openxmlformats.org/presentationml/2006/main">
   <p:cSld>
     <p:spTree>
@@ -6115,7 +6303,7 @@
           <a:p>
             <a:r>
               <a:rPr lang="en-US" dirty="0" smtClean="0"/>
-              <a:t>How Mobile Used To Be…</a:t>
+              <a:t>How It Is Today…</a:t>
             </a:r>
             <a:endParaRPr lang="en-US" dirty="0"/>
           </a:p>
@@ -6123,7 +6311,7 @@
       </p:sp>
       <p:pic>
         <p:nvPicPr>
-          <p:cNvPr id="4" name="Content Placeholder 3" descr="salesforce classic mobile.png"/>
+          <p:cNvPr id="6" name="Content Placeholder 5" descr="Screen Shot 2015-01-31 at 3.22.27 PM.png"/>
           <p:cNvPicPr>
             <a:picLocks noGrp="1" noChangeAspect="1"/>
           </p:cNvPicPr>
@@ -6131,25 +6319,28 @@
             <p:ph idx="1"/>
           </p:nvPr>
         </p:nvPicPr>
-        <p:blipFill>
-          <a:blip r:embed="rId2">
+        <p:blipFill rotWithShape="1">
+          <a:blip r:embed="rId2" cstate="print">
             <a:extLst>
               <a:ext uri="{28A0092B-C50C-407E-A947-70E740481C1C}">
                 <a14:useLocalDpi xmlns:a14="http://schemas.microsoft.com/office/drawing/2010/main" val="0"/>
               </a:ext>
             </a:extLst>
           </a:blip>
-          <a:srcRect l="3710" r="3710"/>
-          <a:stretch>
-            <a:fillRect/>
-          </a:stretch>
+          <a:srcRect l="754" r="721"/>
+          <a:stretch/>
         </p:blipFill>
-        <p:spPr/>
+        <p:spPr>
+          <a:xfrm>
+            <a:off x="0" y="1648375"/>
+            <a:ext cx="9042580" cy="4295226"/>
+          </a:xfrm>
+        </p:spPr>
       </p:pic>
     </p:spTree>
     <p:extLst>
       <p:ext uri="{BB962C8B-B14F-4D97-AF65-F5344CB8AC3E}">
-        <p14:creationId xmlns:p14="http://schemas.microsoft.com/office/powerpoint/2010/main" val="3231553239"/>
+        <p14:creationId xmlns:p14="http://schemas.microsoft.com/office/powerpoint/2010/main" val="134413433"/>
       </p:ext>
     </p:extLst>
   </p:cSld>
@@ -6193,7 +6384,7 @@
           <a:p>
             <a:r>
               <a:rPr lang="en-US" dirty="0" smtClean="0"/>
-              <a:t>Touch? I Remember Touch…</a:t>
+              <a:t>How Mobile Used To Be…</a:t>
             </a:r>
             <a:endParaRPr lang="en-US" dirty="0"/>
           </a:p>
@@ -6201,7 +6392,7 @@
       </p:sp>
       <p:pic>
         <p:nvPicPr>
-          <p:cNvPr id="4" name="Content Placeholder 3" descr="paulwilliams.jpg"/>
+          <p:cNvPr id="4" name="Content Placeholder 3" descr="salesforce classic mobile.png"/>
           <p:cNvPicPr>
             <a:picLocks noGrp="1" noChangeAspect="1"/>
           </p:cNvPicPr>
@@ -6217,47 +6408,17 @@
               </a:ext>
             </a:extLst>
           </a:blip>
-          <a:srcRect l="624" r="624"/>
+          <a:srcRect l="3710" r="3710"/>
           <a:stretch>
             <a:fillRect/>
           </a:stretch>
         </p:blipFill>
         <p:spPr/>
       </p:pic>
-      <p:pic>
-        <p:nvPicPr>
-          <p:cNvPr id="5" name="Picture 4" descr="salesforce touch.jpeg"/>
-          <p:cNvPicPr>
-            <a:picLocks noChangeAspect="1"/>
-          </p:cNvPicPr>
-          <p:nvPr/>
-        </p:nvPicPr>
-        <p:blipFill>
-          <a:blip r:embed="rId3">
-            <a:extLst>
-              <a:ext uri="{28A0092B-C50C-407E-A947-70E740481C1C}">
-                <a14:useLocalDpi xmlns:a14="http://schemas.microsoft.com/office/drawing/2010/main" val="0"/>
-              </a:ext>
-            </a:extLst>
-          </a:blip>
-          <a:stretch>
-            <a:fillRect/>
-          </a:stretch>
-        </p:blipFill>
-        <p:spPr>
-          <a:xfrm>
-            <a:off x="3562940" y="4560728"/>
-            <a:ext cx="1382873" cy="1382873"/>
-          </a:xfrm>
-          <a:prstGeom prst="rect">
-            <a:avLst/>
-          </a:prstGeom>
-        </p:spPr>
-      </p:pic>
     </p:spTree>
     <p:extLst>
       <p:ext uri="{BB962C8B-B14F-4D97-AF65-F5344CB8AC3E}">
-        <p14:creationId xmlns:p14="http://schemas.microsoft.com/office/powerpoint/2010/main" val="1326830440"/>
+        <p14:creationId xmlns:p14="http://schemas.microsoft.com/office/powerpoint/2010/main" val="3231553239"/>
       </p:ext>
     </p:extLst>
   </p:cSld>

</xml_diff>